<commit_message>
Working on schematic for 05 tilt sensor
</commit_message>
<xml_diff>
--- a/Blender/05 Tilt and vibration sensors/Silk screens.pptx
+++ b/Blender/05 Tilt and vibration sensors/Silk screens.pptx
@@ -539,7 +539,7 @@
           <a:p>
             <a:fld id="{835177E4-60BF-4C8D-A659-95F1E6F38172}" type="datetimeFigureOut">
               <a:rPr lang="en-GB" smtClean="0"/>
-              <a:t>31/12/2024</a:t>
+              <a:t>03/01/2025</a:t>
             </a:fld>
             <a:endParaRPr lang="en-GB"/>
           </a:p>
@@ -739,7 +739,7 @@
           <a:p>
             <a:fld id="{835177E4-60BF-4C8D-A659-95F1E6F38172}" type="datetimeFigureOut">
               <a:rPr lang="en-GB" smtClean="0"/>
-              <a:t>31/12/2024</a:t>
+              <a:t>03/01/2025</a:t>
             </a:fld>
             <a:endParaRPr lang="en-GB"/>
           </a:p>
@@ -949,7 +949,7 @@
           <a:p>
             <a:fld id="{835177E4-60BF-4C8D-A659-95F1E6F38172}" type="datetimeFigureOut">
               <a:rPr lang="en-GB" smtClean="0"/>
-              <a:t>31/12/2024</a:t>
+              <a:t>03/01/2025</a:t>
             </a:fld>
             <a:endParaRPr lang="en-GB"/>
           </a:p>
@@ -1149,7 +1149,7 @@
           <a:p>
             <a:fld id="{835177E4-60BF-4C8D-A659-95F1E6F38172}" type="datetimeFigureOut">
               <a:rPr lang="en-GB" smtClean="0"/>
-              <a:t>31/12/2024</a:t>
+              <a:t>03/01/2025</a:t>
             </a:fld>
             <a:endParaRPr lang="en-GB"/>
           </a:p>
@@ -1425,7 +1425,7 @@
           <a:p>
             <a:fld id="{835177E4-60BF-4C8D-A659-95F1E6F38172}" type="datetimeFigureOut">
               <a:rPr lang="en-GB" smtClean="0"/>
-              <a:t>31/12/2024</a:t>
+              <a:t>03/01/2025</a:t>
             </a:fld>
             <a:endParaRPr lang="en-GB"/>
           </a:p>
@@ -1693,7 +1693,7 @@
           <a:p>
             <a:fld id="{835177E4-60BF-4C8D-A659-95F1E6F38172}" type="datetimeFigureOut">
               <a:rPr lang="en-GB" smtClean="0"/>
-              <a:t>31/12/2024</a:t>
+              <a:t>03/01/2025</a:t>
             </a:fld>
             <a:endParaRPr lang="en-GB"/>
           </a:p>
@@ -2108,7 +2108,7 @@
           <a:p>
             <a:fld id="{835177E4-60BF-4C8D-A659-95F1E6F38172}" type="datetimeFigureOut">
               <a:rPr lang="en-GB" smtClean="0"/>
-              <a:t>31/12/2024</a:t>
+              <a:t>03/01/2025</a:t>
             </a:fld>
             <a:endParaRPr lang="en-GB"/>
           </a:p>
@@ -2250,7 +2250,7 @@
           <a:p>
             <a:fld id="{835177E4-60BF-4C8D-A659-95F1E6F38172}" type="datetimeFigureOut">
               <a:rPr lang="en-GB" smtClean="0"/>
-              <a:t>31/12/2024</a:t>
+              <a:t>03/01/2025</a:t>
             </a:fld>
             <a:endParaRPr lang="en-GB"/>
           </a:p>
@@ -2363,7 +2363,7 @@
           <a:p>
             <a:fld id="{835177E4-60BF-4C8D-A659-95F1E6F38172}" type="datetimeFigureOut">
               <a:rPr lang="en-GB" smtClean="0"/>
-              <a:t>31/12/2024</a:t>
+              <a:t>03/01/2025</a:t>
             </a:fld>
             <a:endParaRPr lang="en-GB"/>
           </a:p>
@@ -2676,7 +2676,7 @@
           <a:p>
             <a:fld id="{835177E4-60BF-4C8D-A659-95F1E6F38172}" type="datetimeFigureOut">
               <a:rPr lang="en-GB" smtClean="0"/>
-              <a:t>31/12/2024</a:t>
+              <a:t>03/01/2025</a:t>
             </a:fld>
             <a:endParaRPr lang="en-GB"/>
           </a:p>
@@ -2965,7 +2965,7 @@
           <a:p>
             <a:fld id="{835177E4-60BF-4C8D-A659-95F1E6F38172}" type="datetimeFigureOut">
               <a:rPr lang="en-GB" smtClean="0"/>
-              <a:t>31/12/2024</a:t>
+              <a:t>03/01/2025</a:t>
             </a:fld>
             <a:endParaRPr lang="en-GB"/>
           </a:p>
@@ -3208,7 +3208,7 @@
           <a:p>
             <a:fld id="{835177E4-60BF-4C8D-A659-95F1E6F38172}" type="datetimeFigureOut">
               <a:rPr lang="en-GB" smtClean="0"/>
-              <a:t>31/12/2024</a:t>
+              <a:t>03/01/2025</a:t>
             </a:fld>
             <a:endParaRPr lang="en-GB"/>
           </a:p>
@@ -4663,42 +4663,6 @@
           </a:p>
         </p:txBody>
       </p:sp>
-      <p:pic>
-        <p:nvPicPr>
-          <p:cNvPr id="3" name="Graphic 6">
-            <a:extLst>
-              <a:ext uri="{FF2B5EF4-FFF2-40B4-BE49-F238E27FC236}">
-                <a16:creationId xmlns:a16="http://schemas.microsoft.com/office/drawing/2014/main" id="{56DDB0FD-F2D1-9BE9-6B0D-BED6C08E409D}"/>
-              </a:ext>
-            </a:extLst>
-          </p:cNvPr>
-          <p:cNvPicPr>
-            <a:picLocks noChangeAspect="1"/>
-          </p:cNvPicPr>
-          <p:nvPr/>
-        </p:nvPicPr>
-        <p:blipFill>
-          <a:blip r:embed="rId2">
-            <a:extLst>
-              <a:ext uri="{96DAC541-7B7A-43D3-8B79-37D633B846F1}">
-                <asvg:svgBlip xmlns:asvg="http://schemas.microsoft.com/office/drawing/2016/SVG/main" r:embed="rId3"/>
-              </a:ext>
-            </a:extLst>
-          </a:blip>
-          <a:stretch>
-            <a:fillRect/>
-          </a:stretch>
-        </p:blipFill>
-        <p:spPr>
-          <a:xfrm>
-            <a:off x="6777428" y="1765536"/>
-            <a:ext cx="1446847" cy="2351129"/>
-          </a:xfrm>
-          <a:prstGeom prst="rect">
-            <a:avLst/>
-          </a:prstGeom>
-        </p:spPr>
-      </p:pic>
       <p:sp>
         <p:nvSpPr>
           <p:cNvPr id="6" name="TextBox 5">
@@ -5389,6 +5353,42 @@
           </a:p>
         </p:txBody>
       </p:sp>
+      <p:pic>
+        <p:nvPicPr>
+          <p:cNvPr id="9" name="Graphic 8">
+            <a:extLst>
+              <a:ext uri="{FF2B5EF4-FFF2-40B4-BE49-F238E27FC236}">
+                <a16:creationId xmlns:a16="http://schemas.microsoft.com/office/drawing/2014/main" id="{CB59FE61-85E4-77E0-E9B9-712F7593C13B}"/>
+              </a:ext>
+            </a:extLst>
+          </p:cNvPr>
+          <p:cNvPicPr>
+            <a:picLocks noChangeAspect="1"/>
+          </p:cNvPicPr>
+          <p:nvPr/>
+        </p:nvPicPr>
+        <p:blipFill>
+          <a:blip r:embed="rId2">
+            <a:extLst>
+              <a:ext uri="{96DAC541-7B7A-43D3-8B79-37D633B846F1}">
+                <asvg:svgBlip xmlns:asvg="http://schemas.microsoft.com/office/drawing/2016/SVG/main" r:embed="rId3"/>
+              </a:ext>
+            </a:extLst>
+          </a:blip>
+          <a:stretch>
+            <a:fillRect/>
+          </a:stretch>
+        </p:blipFill>
+        <p:spPr>
+          <a:xfrm>
+            <a:off x="6810332" y="1829254"/>
+            <a:ext cx="1315315" cy="2268921"/>
+          </a:xfrm>
+          <a:prstGeom prst="rect">
+            <a:avLst/>
+          </a:prstGeom>
+        </p:spPr>
+      </p:pic>
     </p:spTree>
     <p:extLst>
       <p:ext uri="{BB962C8B-B14F-4D97-AF65-F5344CB8AC3E}">

</xml_diff>

<commit_message>
Edited 05 tilt sensor car alarm
</commit_message>
<xml_diff>
--- a/Blender/05 Tilt and vibration sensors/Silk screens.pptx
+++ b/Blender/05 Tilt and vibration sensors/Silk screens.pptx
@@ -5389,6 +5389,77 @@
           </a:prstGeom>
         </p:spPr>
       </p:pic>
+      <p:pic>
+        <p:nvPicPr>
+          <p:cNvPr id="7" name="Graphic 6">
+            <a:extLst>
+              <a:ext uri="{FF2B5EF4-FFF2-40B4-BE49-F238E27FC236}">
+                <a16:creationId xmlns:a16="http://schemas.microsoft.com/office/drawing/2014/main" id="{518C5401-CE86-1316-FB98-D2350923850D}"/>
+              </a:ext>
+            </a:extLst>
+          </p:cNvPr>
+          <p:cNvPicPr>
+            <a:picLocks noChangeAspect="1"/>
+          </p:cNvPicPr>
+          <p:nvPr/>
+        </p:nvPicPr>
+        <p:blipFill>
+          <a:blip r:embed="rId4">
+            <a:extLst>
+              <a:ext uri="{96DAC541-7B7A-43D3-8B79-37D633B846F1}">
+                <asvg:svgBlip xmlns:asvg="http://schemas.microsoft.com/office/drawing/2016/SVG/main" r:embed="rId5"/>
+              </a:ext>
+            </a:extLst>
+          </a:blip>
+          <a:stretch>
+            <a:fillRect/>
+          </a:stretch>
+        </p:blipFill>
+        <p:spPr>
+          <a:xfrm>
+            <a:off x="9016209" y="830347"/>
+            <a:ext cx="2466975" cy="4000500"/>
+          </a:xfrm>
+          <a:prstGeom prst="rect">
+            <a:avLst/>
+          </a:prstGeom>
+        </p:spPr>
+      </p:pic>
+      <p:sp>
+        <p:nvSpPr>
+          <p:cNvPr id="10" name="TextBox 9">
+            <a:extLst>
+              <a:ext uri="{FF2B5EF4-FFF2-40B4-BE49-F238E27FC236}">
+                <a16:creationId xmlns:a16="http://schemas.microsoft.com/office/drawing/2014/main" id="{DCB2A3CD-C6FB-CB6A-E924-DD38FC4CF470}"/>
+              </a:ext>
+            </a:extLst>
+          </p:cNvPr>
+          <p:cNvSpPr txBox="1"/>
+          <p:nvPr/>
+        </p:nvSpPr>
+        <p:spPr>
+          <a:xfrm>
+            <a:off x="9828665" y="4752342"/>
+            <a:ext cx="1238562" cy="261610"/>
+          </a:xfrm>
+          <a:prstGeom prst="rect">
+            <a:avLst/>
+          </a:prstGeom>
+          <a:noFill/>
+        </p:spPr>
+        <p:txBody>
+          <a:bodyPr wrap="square" rtlCol="0">
+            <a:spAutoFit/>
+          </a:bodyPr>
+          <a:lstStyle/>
+          <a:p>
+            <a:r>
+              <a:rPr lang="en-GB" sz="1050" dirty="0"/>
+              <a:t>1 2 3 4 5 6 7</a:t>
+            </a:r>
+          </a:p>
+        </p:txBody>
+      </p:sp>
     </p:spTree>
     <p:extLst>
       <p:ext uri="{BB962C8B-B14F-4D97-AF65-F5344CB8AC3E}">

</xml_diff>